<commit_message>
Added equations to powerpoint.
</commit_message>
<xml_diff>
--- a/Final Report/Presentation.pptx
+++ b/Final Report/Presentation.pptx
@@ -7,11 +7,13 @@
   <p:sldIdLst>
     <p:sldId id="256" r:id="rId2"/>
     <p:sldId id="257" r:id="rId3"/>
-    <p:sldId id="258" r:id="rId4"/>
-    <p:sldId id="260" r:id="rId5"/>
-    <p:sldId id="259" r:id="rId6"/>
-    <p:sldId id="261" r:id="rId7"/>
-    <p:sldId id="262" r:id="rId8"/>
+    <p:sldId id="263" r:id="rId4"/>
+    <p:sldId id="258" r:id="rId5"/>
+    <p:sldId id="260" r:id="rId6"/>
+    <p:sldId id="259" r:id="rId7"/>
+    <p:sldId id="261" r:id="rId8"/>
+    <p:sldId id="264" r:id="rId9"/>
+    <p:sldId id="262" r:id="rId10"/>
   </p:sldIdLst>
   <p:sldSz cx="12192000" cy="6858000"/>
   <p:notesSz cx="6858000" cy="9144000"/>
@@ -110,6 +112,11 @@
       </a:defRPr>
     </a:lvl9pPr>
   </p:defaultTextStyle>
+  <p:extLst>
+    <p:ext uri="{EFAFB233-063F-42B5-8137-9DF3F51BA10A}">
+      <p15:sldGuideLst xmlns:p15="http://schemas.microsoft.com/office/powerpoint/2012/main"/>
+    </p:ext>
+  </p:extLst>
 </p:presentation>
 </file>
 
@@ -260,7 +267,7 @@
           <a:p>
             <a:fld id="{4E75A037-32F6-5D4E-B7A3-766DFDF3497E}" type="datetimeFigureOut">
               <a:rPr lang="en-US" smtClean="0"/>
-              <a:t>12/8/22</a:t>
+              <a:t>12/12/22</a:t>
             </a:fld>
             <a:endParaRPr lang="en-US"/>
           </a:p>
@@ -458,7 +465,7 @@
           <a:p>
             <a:fld id="{4E75A037-32F6-5D4E-B7A3-766DFDF3497E}" type="datetimeFigureOut">
               <a:rPr lang="en-US" smtClean="0"/>
-              <a:t>12/8/22</a:t>
+              <a:t>12/12/22</a:t>
             </a:fld>
             <a:endParaRPr lang="en-US"/>
           </a:p>
@@ -666,7 +673,7 @@
           <a:p>
             <a:fld id="{4E75A037-32F6-5D4E-B7A3-766DFDF3497E}" type="datetimeFigureOut">
               <a:rPr lang="en-US" smtClean="0"/>
-              <a:t>12/8/22</a:t>
+              <a:t>12/12/22</a:t>
             </a:fld>
             <a:endParaRPr lang="en-US"/>
           </a:p>
@@ -864,7 +871,7 @@
           <a:p>
             <a:fld id="{4E75A037-32F6-5D4E-B7A3-766DFDF3497E}" type="datetimeFigureOut">
               <a:rPr lang="en-US" smtClean="0"/>
-              <a:t>12/8/22</a:t>
+              <a:t>12/12/22</a:t>
             </a:fld>
             <a:endParaRPr lang="en-US"/>
           </a:p>
@@ -1139,7 +1146,7 @@
           <a:p>
             <a:fld id="{4E75A037-32F6-5D4E-B7A3-766DFDF3497E}" type="datetimeFigureOut">
               <a:rPr lang="en-US" smtClean="0"/>
-              <a:t>12/8/22</a:t>
+              <a:t>12/12/22</a:t>
             </a:fld>
             <a:endParaRPr lang="en-US"/>
           </a:p>
@@ -1404,7 +1411,7 @@
           <a:p>
             <a:fld id="{4E75A037-32F6-5D4E-B7A3-766DFDF3497E}" type="datetimeFigureOut">
               <a:rPr lang="en-US" smtClean="0"/>
-              <a:t>12/8/22</a:t>
+              <a:t>12/12/22</a:t>
             </a:fld>
             <a:endParaRPr lang="en-US"/>
           </a:p>
@@ -1816,7 +1823,7 @@
           <a:p>
             <a:fld id="{4E75A037-32F6-5D4E-B7A3-766DFDF3497E}" type="datetimeFigureOut">
               <a:rPr lang="en-US" smtClean="0"/>
-              <a:t>12/8/22</a:t>
+              <a:t>12/12/22</a:t>
             </a:fld>
             <a:endParaRPr lang="en-US"/>
           </a:p>
@@ -1957,7 +1964,7 @@
           <a:p>
             <a:fld id="{4E75A037-32F6-5D4E-B7A3-766DFDF3497E}" type="datetimeFigureOut">
               <a:rPr lang="en-US" smtClean="0"/>
-              <a:t>12/8/22</a:t>
+              <a:t>12/12/22</a:t>
             </a:fld>
             <a:endParaRPr lang="en-US"/>
           </a:p>
@@ -2070,7 +2077,7 @@
           <a:p>
             <a:fld id="{4E75A037-32F6-5D4E-B7A3-766DFDF3497E}" type="datetimeFigureOut">
               <a:rPr lang="en-US" smtClean="0"/>
-              <a:t>12/8/22</a:t>
+              <a:t>12/12/22</a:t>
             </a:fld>
             <a:endParaRPr lang="en-US"/>
           </a:p>
@@ -2381,7 +2388,7 @@
           <a:p>
             <a:fld id="{4E75A037-32F6-5D4E-B7A3-766DFDF3497E}" type="datetimeFigureOut">
               <a:rPr lang="en-US" smtClean="0"/>
-              <a:t>12/8/22</a:t>
+              <a:t>12/12/22</a:t>
             </a:fld>
             <a:endParaRPr lang="en-US"/>
           </a:p>
@@ -2669,7 +2676,7 @@
           <a:p>
             <a:fld id="{4E75A037-32F6-5D4E-B7A3-766DFDF3497E}" type="datetimeFigureOut">
               <a:rPr lang="en-US" smtClean="0"/>
-              <a:t>12/8/22</a:t>
+              <a:t>12/12/22</a:t>
             </a:fld>
             <a:endParaRPr lang="en-US"/>
           </a:p>
@@ -2910,7 +2917,7 @@
           <a:p>
             <a:fld id="{4E75A037-32F6-5D4E-B7A3-766DFDF3497E}" type="datetimeFigureOut">
               <a:rPr lang="en-US" smtClean="0"/>
-              <a:t>12/8/22</a:t>
+              <a:t>12/12/22</a:t>
             </a:fld>
             <a:endParaRPr lang="en-US"/>
           </a:p>
@@ -3443,10 +3450,10 @@
       </p:sp>
       <p:pic>
         <p:nvPicPr>
-          <p:cNvPr id="5" name="Picture 4" descr="Chart, line chart&#10;&#10;Description automatically generated">
-            <a:extLst>
-              <a:ext uri="{FF2B5EF4-FFF2-40B4-BE49-F238E27FC236}">
-                <a16:creationId xmlns:a16="http://schemas.microsoft.com/office/drawing/2014/main" id="{504E28DA-BF20-2CB4-80B1-D86BC3CC900E}"/>
+          <p:cNvPr id="4" name="Picture 3">
+            <a:extLst>
+              <a:ext uri="{FF2B5EF4-FFF2-40B4-BE49-F238E27FC236}">
+                <a16:creationId xmlns:a16="http://schemas.microsoft.com/office/drawing/2014/main" id="{6BF41299-2783-ED92-6F79-839117B03B51}"/>
               </a:ext>
             </a:extLst>
           </p:cNvPr>
@@ -3463,38 +3470,8 @@
         </p:blipFill>
         <p:spPr>
           <a:xfrm>
-            <a:off x="4809809" y="2159001"/>
-            <a:ext cx="5891210" cy="3927474"/>
-          </a:xfrm>
-          <a:prstGeom prst="rect">
-            <a:avLst/>
-          </a:prstGeom>
-        </p:spPr>
-      </p:pic>
-      <p:pic>
-        <p:nvPicPr>
-          <p:cNvPr id="7" name="Picture 6" descr="Graphical user interface, text, application&#10;&#10;Description automatically generated">
-            <a:extLst>
-              <a:ext uri="{FF2B5EF4-FFF2-40B4-BE49-F238E27FC236}">
-                <a16:creationId xmlns:a16="http://schemas.microsoft.com/office/drawing/2014/main" id="{A2E53576-C63D-31FE-DDCD-6515B54EE7C2}"/>
-              </a:ext>
-            </a:extLst>
-          </p:cNvPr>
-          <p:cNvPicPr>
-            <a:picLocks noChangeAspect="1"/>
-          </p:cNvPicPr>
-          <p:nvPr/>
-        </p:nvPicPr>
-        <p:blipFill>
-          <a:blip r:embed="rId3"/>
-          <a:stretch>
-            <a:fillRect/>
-          </a:stretch>
-        </p:blipFill>
-        <p:spPr>
-          <a:xfrm>
-            <a:off x="838200" y="2159001"/>
-            <a:ext cx="4254500" cy="1562100"/>
+            <a:off x="2209800" y="2106182"/>
+            <a:ext cx="7772400" cy="3747667"/>
           </a:xfrm>
           <a:prstGeom prst="rect">
             <a:avLst/>
@@ -3561,6 +3538,124 @@
       </p:sp>
       <p:pic>
         <p:nvPicPr>
+          <p:cNvPr id="5" name="Picture 4" descr="Chart, line chart&#10;&#10;Description automatically generated">
+            <a:extLst>
+              <a:ext uri="{FF2B5EF4-FFF2-40B4-BE49-F238E27FC236}">
+                <a16:creationId xmlns:a16="http://schemas.microsoft.com/office/drawing/2014/main" id="{504E28DA-BF20-2CB4-80B1-D86BC3CC900E}"/>
+              </a:ext>
+            </a:extLst>
+          </p:cNvPr>
+          <p:cNvPicPr>
+            <a:picLocks noChangeAspect="1"/>
+          </p:cNvPicPr>
+          <p:nvPr/>
+        </p:nvPicPr>
+        <p:blipFill>
+          <a:blip r:embed="rId2"/>
+          <a:stretch>
+            <a:fillRect/>
+          </a:stretch>
+        </p:blipFill>
+        <p:spPr>
+          <a:xfrm>
+            <a:off x="4809809" y="2159001"/>
+            <a:ext cx="5891210" cy="3927474"/>
+          </a:xfrm>
+          <a:prstGeom prst="rect">
+            <a:avLst/>
+          </a:prstGeom>
+        </p:spPr>
+      </p:pic>
+      <p:pic>
+        <p:nvPicPr>
+          <p:cNvPr id="7" name="Picture 6" descr="Graphical user interface, text, application&#10;&#10;Description automatically generated">
+            <a:extLst>
+              <a:ext uri="{FF2B5EF4-FFF2-40B4-BE49-F238E27FC236}">
+                <a16:creationId xmlns:a16="http://schemas.microsoft.com/office/drawing/2014/main" id="{A2E53576-C63D-31FE-DDCD-6515B54EE7C2}"/>
+              </a:ext>
+            </a:extLst>
+          </p:cNvPr>
+          <p:cNvPicPr>
+            <a:picLocks noChangeAspect="1"/>
+          </p:cNvPicPr>
+          <p:nvPr/>
+        </p:nvPicPr>
+        <p:blipFill>
+          <a:blip r:embed="rId3"/>
+          <a:stretch>
+            <a:fillRect/>
+          </a:stretch>
+        </p:blipFill>
+        <p:spPr>
+          <a:xfrm>
+            <a:off x="838200" y="2159001"/>
+            <a:ext cx="4254500" cy="1562100"/>
+          </a:xfrm>
+          <a:prstGeom prst="rect">
+            <a:avLst/>
+          </a:prstGeom>
+        </p:spPr>
+      </p:pic>
+    </p:spTree>
+    <p:extLst>
+      <p:ext uri="{BB962C8B-B14F-4D97-AF65-F5344CB8AC3E}">
+        <p14:creationId xmlns:p14="http://schemas.microsoft.com/office/powerpoint/2010/main" val="553435471"/>
+      </p:ext>
+    </p:extLst>
+  </p:cSld>
+  <p:clrMapOvr>
+    <a:masterClrMapping/>
+  </p:clrMapOvr>
+</p:sld>
+</file>
+
+<file path=ppt/slides/slide4.xml><?xml version="1.0" encoding="utf-8"?>
+<p:sld xmlns:a="http://schemas.openxmlformats.org/drawingml/2006/main" xmlns:r="http://schemas.openxmlformats.org/officeDocument/2006/relationships" xmlns:p="http://schemas.openxmlformats.org/presentationml/2006/main">
+  <p:cSld>
+    <p:spTree>
+      <p:nvGrpSpPr>
+        <p:cNvPr id="1" name=""/>
+        <p:cNvGrpSpPr/>
+        <p:nvPr/>
+      </p:nvGrpSpPr>
+      <p:grpSpPr>
+        <a:xfrm>
+          <a:off x="0" y="0"/>
+          <a:ext cx="0" cy="0"/>
+          <a:chOff x="0" y="0"/>
+          <a:chExt cx="0" cy="0"/>
+        </a:xfrm>
+      </p:grpSpPr>
+      <p:sp>
+        <p:nvSpPr>
+          <p:cNvPr id="2" name="Title 1">
+            <a:extLst>
+              <a:ext uri="{FF2B5EF4-FFF2-40B4-BE49-F238E27FC236}">
+                <a16:creationId xmlns:a16="http://schemas.microsoft.com/office/drawing/2014/main" id="{3C9E5105-2685-AE43-D931-8D962A2EB645}"/>
+              </a:ext>
+            </a:extLst>
+          </p:cNvPr>
+          <p:cNvSpPr>
+            <a:spLocks noGrp="1"/>
+          </p:cNvSpPr>
+          <p:nvPr>
+            <p:ph type="title"/>
+          </p:nvPr>
+        </p:nvSpPr>
+        <p:spPr/>
+        <p:txBody>
+          <a:bodyPr/>
+          <a:lstStyle/>
+          <a:p>
+            <a:r>
+              <a:rPr lang="en-US" dirty="0"/>
+              <a:t>First Design</a:t>
+            </a:r>
+          </a:p>
+        </p:txBody>
+      </p:sp>
+      <p:pic>
+        <p:nvPicPr>
           <p:cNvPr id="4" name="Picture 3" descr="Chart, line chart&#10;&#10;Description automatically generated">
             <a:extLst>
               <a:ext uri="{FF2B5EF4-FFF2-40B4-BE49-F238E27FC236}">
@@ -3632,7 +3727,7 @@
 </p:sld>
 </file>
 
-<file path=ppt/slides/slide4.xml><?xml version="1.0" encoding="utf-8"?>
+<file path=ppt/slides/slide5.xml><?xml version="1.0" encoding="utf-8"?>
 <p:sld xmlns:a="http://schemas.openxmlformats.org/drawingml/2006/main" xmlns:r="http://schemas.openxmlformats.org/officeDocument/2006/relationships" xmlns:p="http://schemas.openxmlformats.org/presentationml/2006/main">
   <p:cSld>
     <p:spTree>
@@ -3720,7 +3815,7 @@
 </p:sld>
 </file>
 
-<file path=ppt/slides/slide5.xml><?xml version="1.0" encoding="utf-8"?>
+<file path=ppt/slides/slide6.xml><?xml version="1.0" encoding="utf-8"?>
 <p:sld xmlns:a="http://schemas.openxmlformats.org/drawingml/2006/main" xmlns:r="http://schemas.openxmlformats.org/officeDocument/2006/relationships" xmlns:p="http://schemas.openxmlformats.org/presentationml/2006/main">
   <p:cSld>
     <p:spTree>
@@ -3808,7 +3903,95 @@
 </p:sld>
 </file>
 
-<file path=ppt/slides/slide6.xml><?xml version="1.0" encoding="utf-8"?>
+<file path=ppt/slides/slide7.xml><?xml version="1.0" encoding="utf-8"?>
+<p:sld xmlns:a="http://schemas.openxmlformats.org/drawingml/2006/main" xmlns:r="http://schemas.openxmlformats.org/officeDocument/2006/relationships" xmlns:p="http://schemas.openxmlformats.org/presentationml/2006/main">
+  <p:cSld>
+    <p:spTree>
+      <p:nvGrpSpPr>
+        <p:cNvPr id="1" name=""/>
+        <p:cNvGrpSpPr/>
+        <p:nvPr/>
+      </p:nvGrpSpPr>
+      <p:grpSpPr>
+        <a:xfrm>
+          <a:off x="0" y="0"/>
+          <a:ext cx="0" cy="0"/>
+          <a:chOff x="0" y="0"/>
+          <a:chExt cx="0" cy="0"/>
+        </a:xfrm>
+      </p:grpSpPr>
+      <p:sp>
+        <p:nvSpPr>
+          <p:cNvPr id="2" name="Title 1">
+            <a:extLst>
+              <a:ext uri="{FF2B5EF4-FFF2-40B4-BE49-F238E27FC236}">
+                <a16:creationId xmlns:a16="http://schemas.microsoft.com/office/drawing/2014/main" id="{3C9E5105-2685-AE43-D931-8D962A2EB645}"/>
+              </a:ext>
+            </a:extLst>
+          </p:cNvPr>
+          <p:cNvSpPr>
+            <a:spLocks noGrp="1"/>
+          </p:cNvSpPr>
+          <p:nvPr>
+            <p:ph type="title"/>
+          </p:nvPr>
+        </p:nvSpPr>
+        <p:spPr/>
+        <p:txBody>
+          <a:bodyPr/>
+          <a:lstStyle/>
+          <a:p>
+            <a:r>
+              <a:rPr lang="en-US" dirty="0"/>
+              <a:t>Second Design</a:t>
+            </a:r>
+          </a:p>
+        </p:txBody>
+      </p:sp>
+      <p:pic>
+        <p:nvPicPr>
+          <p:cNvPr id="4" name="Picture 3">
+            <a:extLst>
+              <a:ext uri="{FF2B5EF4-FFF2-40B4-BE49-F238E27FC236}">
+                <a16:creationId xmlns:a16="http://schemas.microsoft.com/office/drawing/2014/main" id="{0DE14D5D-FF24-C5AA-3B70-EF1175368345}"/>
+              </a:ext>
+            </a:extLst>
+          </p:cNvPr>
+          <p:cNvPicPr>
+            <a:picLocks noChangeAspect="1"/>
+          </p:cNvPicPr>
+          <p:nvPr/>
+        </p:nvPicPr>
+        <p:blipFill>
+          <a:blip r:embed="rId2"/>
+          <a:stretch>
+            <a:fillRect/>
+          </a:stretch>
+        </p:blipFill>
+        <p:spPr>
+          <a:xfrm>
+            <a:off x="2209800" y="1690688"/>
+            <a:ext cx="7772400" cy="3719751"/>
+          </a:xfrm>
+          <a:prstGeom prst="rect">
+            <a:avLst/>
+          </a:prstGeom>
+        </p:spPr>
+      </p:pic>
+    </p:spTree>
+    <p:extLst>
+      <p:ext uri="{BB962C8B-B14F-4D97-AF65-F5344CB8AC3E}">
+        <p14:creationId xmlns:p14="http://schemas.microsoft.com/office/powerpoint/2010/main" val="2582861219"/>
+      </p:ext>
+    </p:extLst>
+  </p:cSld>
+  <p:clrMapOvr>
+    <a:masterClrMapping/>
+  </p:clrMapOvr>
+</p:sld>
+</file>
+
+<file path=ppt/slides/slide8.xml><?xml version="1.0" encoding="utf-8"?>
 <p:sld xmlns:a="http://schemas.openxmlformats.org/drawingml/2006/main" xmlns:r="http://schemas.openxmlformats.org/officeDocument/2006/relationships" xmlns:p="http://schemas.openxmlformats.org/presentationml/2006/main">
   <p:cSld>
     <p:spTree>
@@ -3916,7 +4099,7 @@
     </p:spTree>
     <p:extLst>
       <p:ext uri="{BB962C8B-B14F-4D97-AF65-F5344CB8AC3E}">
-        <p14:creationId xmlns:p14="http://schemas.microsoft.com/office/powerpoint/2010/main" val="2582861219"/>
+        <p14:creationId xmlns:p14="http://schemas.microsoft.com/office/powerpoint/2010/main" val="2979569235"/>
       </p:ext>
     </p:extLst>
   </p:cSld>
@@ -3926,7 +4109,7 @@
 </p:sld>
 </file>
 
-<file path=ppt/slides/slide7.xml><?xml version="1.0" encoding="utf-8"?>
+<file path=ppt/slides/slide9.xml><?xml version="1.0" encoding="utf-8"?>
 <p:sld xmlns:a="http://schemas.openxmlformats.org/drawingml/2006/main" xmlns:r="http://schemas.openxmlformats.org/officeDocument/2006/relationships" xmlns:p="http://schemas.openxmlformats.org/presentationml/2006/main">
   <p:cSld>
     <p:spTree>

</xml_diff>